<commit_message>
antes de inserir novas imagens
</commit_message>
<xml_diff>
--- a/dissertacao-docs/apresentacoes/Dissertação - RDM - EMA - Imagens-Retrato.pptx
+++ b/dissertacao-docs/apresentacoes/Dissertação - RDM - EMA - Imagens-Retrato.pptx
@@ -20,6 +20,8 @@
     <p:sldId id="270" r:id="rId14"/>
     <p:sldId id="273" r:id="rId15"/>
     <p:sldId id="271" r:id="rId16"/>
+    <p:sldId id="274" r:id="rId17"/>
+    <p:sldId id="275" r:id="rId18"/>
   </p:sldIdLst>
   <p:sldSz cx="5759450" cy="8640763"/>
   <p:notesSz cx="6858000" cy="9144000"/>
@@ -320,7 +322,7 @@
           <a:p>
             <a:fld id="{2E700DB3-DBF0-4086-B675-117E7A9610B8}" type="datetimeFigureOut">
               <a:rPr lang="pt-BR" smtClean="0"/>
-              <a:t>02/02/2018</a:t>
+              <a:t>03/02/2018</a:t>
             </a:fld>
             <a:endParaRPr lang="pt-BR"/>
           </a:p>
@@ -483,7 +485,7 @@
           <a:p>
             <a:fld id="{2E700DB3-DBF0-4086-B675-117E7A9610B8}" type="datetimeFigureOut">
               <a:rPr lang="pt-BR" smtClean="0"/>
-              <a:t>02/02/2018</a:t>
+              <a:t>03/02/2018</a:t>
             </a:fld>
             <a:endParaRPr lang="pt-BR"/>
           </a:p>
@@ -656,7 +658,7 @@
           <a:p>
             <a:fld id="{2E700DB3-DBF0-4086-B675-117E7A9610B8}" type="datetimeFigureOut">
               <a:rPr lang="pt-BR" smtClean="0"/>
-              <a:t>02/02/2018</a:t>
+              <a:t>03/02/2018</a:t>
             </a:fld>
             <a:endParaRPr lang="pt-BR"/>
           </a:p>
@@ -819,7 +821,7 @@
           <a:p>
             <a:fld id="{2E700DB3-DBF0-4086-B675-117E7A9610B8}" type="datetimeFigureOut">
               <a:rPr lang="pt-BR" smtClean="0"/>
-              <a:t>02/02/2018</a:t>
+              <a:t>03/02/2018</a:t>
             </a:fld>
             <a:endParaRPr lang="pt-BR"/>
           </a:p>
@@ -1059,7 +1061,7 @@
           <a:p>
             <a:fld id="{2E700DB3-DBF0-4086-B675-117E7A9610B8}" type="datetimeFigureOut">
               <a:rPr lang="pt-BR" smtClean="0"/>
-              <a:t>02/02/2018</a:t>
+              <a:t>03/02/2018</a:t>
             </a:fld>
             <a:endParaRPr lang="pt-BR"/>
           </a:p>
@@ -1339,7 +1341,7 @@
           <a:p>
             <a:fld id="{2E700DB3-DBF0-4086-B675-117E7A9610B8}" type="datetimeFigureOut">
               <a:rPr lang="pt-BR" smtClean="0"/>
-              <a:t>02/02/2018</a:t>
+              <a:t>03/02/2018</a:t>
             </a:fld>
             <a:endParaRPr lang="pt-BR"/>
           </a:p>
@@ -1753,7 +1755,7 @@
           <a:p>
             <a:fld id="{2E700DB3-DBF0-4086-B675-117E7A9610B8}" type="datetimeFigureOut">
               <a:rPr lang="pt-BR" smtClean="0"/>
-              <a:t>02/02/2018</a:t>
+              <a:t>03/02/2018</a:t>
             </a:fld>
             <a:endParaRPr lang="pt-BR"/>
           </a:p>
@@ -1865,7 +1867,7 @@
           <a:p>
             <a:fld id="{2E700DB3-DBF0-4086-B675-117E7A9610B8}" type="datetimeFigureOut">
               <a:rPr lang="pt-BR" smtClean="0"/>
-              <a:t>02/02/2018</a:t>
+              <a:t>03/02/2018</a:t>
             </a:fld>
             <a:endParaRPr lang="pt-BR"/>
           </a:p>
@@ -1955,7 +1957,7 @@
           <a:p>
             <a:fld id="{2E700DB3-DBF0-4086-B675-117E7A9610B8}" type="datetimeFigureOut">
               <a:rPr lang="pt-BR" smtClean="0"/>
-              <a:t>02/02/2018</a:t>
+              <a:t>03/02/2018</a:t>
             </a:fld>
             <a:endParaRPr lang="pt-BR"/>
           </a:p>
@@ -2225,7 +2227,7 @@
           <a:p>
             <a:fld id="{2E700DB3-DBF0-4086-B675-117E7A9610B8}" type="datetimeFigureOut">
               <a:rPr lang="pt-BR" smtClean="0"/>
-              <a:t>02/02/2018</a:t>
+              <a:t>03/02/2018</a:t>
             </a:fld>
             <a:endParaRPr lang="pt-BR"/>
           </a:p>
@@ -2472,7 +2474,7 @@
           <a:p>
             <a:fld id="{2E700DB3-DBF0-4086-B675-117E7A9610B8}" type="datetimeFigureOut">
               <a:rPr lang="pt-BR" smtClean="0"/>
-              <a:t>02/02/2018</a:t>
+              <a:t>03/02/2018</a:t>
             </a:fld>
             <a:endParaRPr lang="pt-BR"/>
           </a:p>
@@ -2678,7 +2680,7 @@
           <a:p>
             <a:fld id="{2E700DB3-DBF0-4086-B675-117E7A9610B8}" type="datetimeFigureOut">
               <a:rPr lang="pt-BR" smtClean="0"/>
-              <a:t>02/02/2018</a:t>
+              <a:t>03/02/2018</a:t>
             </a:fld>
             <a:endParaRPr lang="pt-BR"/>
           </a:p>
@@ -13404,60 +13406,935 @@
           <a:chExt cx="0" cy="0"/>
         </a:xfrm>
       </p:grpSpPr>
-      <p:sp>
-        <p:nvSpPr>
-          <p:cNvPr id="2" name="Título 1">
+      <p:pic>
+        <p:nvPicPr>
+          <p:cNvPr id="4" name="Imagem 3">
             <a:extLst>
               <a:ext uri="{FF2B5EF4-FFF2-40B4-BE49-F238E27FC236}">
-                <a16:creationId xmlns:a16="http://schemas.microsoft.com/office/drawing/2014/main" id="{05DA1582-2C24-4D3A-A095-71F0ECD00204}"/>
+                <a16:creationId xmlns:a16="http://schemas.microsoft.com/office/drawing/2014/main" id="{9CB8AA96-C351-495C-8E1B-10D1C952BA04}"/>
               </a:ext>
             </a:extLst>
           </p:cNvPr>
-          <p:cNvSpPr>
-            <a:spLocks noGrp="1"/>
-          </p:cNvSpPr>
-          <p:nvPr>
-            <p:ph type="title"/>
-          </p:nvPr>
+          <p:cNvPicPr>
+            <a:picLocks noChangeAspect="1"/>
+          </p:cNvPicPr>
+          <p:nvPr/>
+        </p:nvPicPr>
+        <p:blipFill>
+          <a:blip r:embed="rId2" cstate="print">
+            <a:extLst>
+              <a:ext uri="{28A0092B-C50C-407E-A947-70E740481C1C}">
+                <a14:useLocalDpi xmlns:a14="http://schemas.microsoft.com/office/drawing/2010/main" val="0"/>
+              </a:ext>
+            </a:extLst>
+          </a:blip>
+          <a:stretch>
+            <a:fillRect/>
+          </a:stretch>
+        </p:blipFill>
+        <p:spPr>
+          <a:xfrm>
+            <a:off x="0" y="794"/>
+            <a:ext cx="5759450" cy="8639175"/>
+          </a:xfrm>
+          <a:prstGeom prst="rect">
+            <a:avLst/>
+          </a:prstGeom>
+        </p:spPr>
+      </p:pic>
+      <p:cxnSp>
+        <p:nvCxnSpPr>
+          <p:cNvPr id="7" name="Conector de Seta Reta 6">
+            <a:extLst>
+              <a:ext uri="{FF2B5EF4-FFF2-40B4-BE49-F238E27FC236}">
+                <a16:creationId xmlns:a16="http://schemas.microsoft.com/office/drawing/2014/main" id="{FBF95A3F-120C-40F8-A89D-35D3110CE65E}"/>
+              </a:ext>
+            </a:extLst>
+          </p:cNvPr>
+          <p:cNvCxnSpPr>
+            <a:cxnSpLocks/>
+          </p:cNvCxnSpPr>
+          <p:nvPr/>
+        </p:nvCxnSpPr>
+        <p:spPr>
+          <a:xfrm flipH="1" flipV="1">
+            <a:off x="1223541" y="863997"/>
+            <a:ext cx="216024" cy="288032"/>
+          </a:xfrm>
+          <a:prstGeom prst="straightConnector1">
+            <a:avLst/>
+          </a:prstGeom>
+          <a:ln>
+            <a:tailEnd type="triangle"/>
+          </a:ln>
+        </p:spPr>
+        <p:style>
+          <a:lnRef idx="1">
+            <a:schemeClr val="dk1"/>
+          </a:lnRef>
+          <a:fillRef idx="0">
+            <a:schemeClr val="dk1"/>
+          </a:fillRef>
+          <a:effectRef idx="0">
+            <a:schemeClr val="dk1"/>
+          </a:effectRef>
+          <a:fontRef idx="minor">
+            <a:schemeClr val="tx1"/>
+          </a:fontRef>
+        </p:style>
+      </p:cxnSp>
+      <p:cxnSp>
+        <p:nvCxnSpPr>
+          <p:cNvPr id="8" name="Conector de Seta Reta 7">
+            <a:extLst>
+              <a:ext uri="{FF2B5EF4-FFF2-40B4-BE49-F238E27FC236}">
+                <a16:creationId xmlns:a16="http://schemas.microsoft.com/office/drawing/2014/main" id="{4EB2190A-FF43-427E-A178-C6C95EF423C2}"/>
+              </a:ext>
+            </a:extLst>
+          </p:cNvPr>
+          <p:cNvCxnSpPr>
+            <a:cxnSpLocks/>
+          </p:cNvCxnSpPr>
+          <p:nvPr/>
+        </p:nvCxnSpPr>
+        <p:spPr>
+          <a:xfrm flipV="1">
+            <a:off x="2627697" y="1152029"/>
+            <a:ext cx="252028" cy="236835"/>
+          </a:xfrm>
+          <a:prstGeom prst="straightConnector1">
+            <a:avLst/>
+          </a:prstGeom>
+          <a:ln>
+            <a:tailEnd type="triangle"/>
+          </a:ln>
+        </p:spPr>
+        <p:style>
+          <a:lnRef idx="1">
+            <a:schemeClr val="dk1"/>
+          </a:lnRef>
+          <a:fillRef idx="0">
+            <a:schemeClr val="dk1"/>
+          </a:fillRef>
+          <a:effectRef idx="0">
+            <a:schemeClr val="dk1"/>
+          </a:effectRef>
+          <a:fontRef idx="minor">
+            <a:schemeClr val="tx1"/>
+          </a:fontRef>
+        </p:style>
+      </p:cxnSp>
+      <p:cxnSp>
+        <p:nvCxnSpPr>
+          <p:cNvPr id="11" name="Conector de Seta Reta 10">
+            <a:extLst>
+              <a:ext uri="{FF2B5EF4-FFF2-40B4-BE49-F238E27FC236}">
+                <a16:creationId xmlns:a16="http://schemas.microsoft.com/office/drawing/2014/main" id="{C26D262C-C104-4CB7-A01A-C24424F56AE7}"/>
+              </a:ext>
+            </a:extLst>
+          </p:cNvPr>
+          <p:cNvCxnSpPr>
+            <a:cxnSpLocks/>
+          </p:cNvCxnSpPr>
+          <p:nvPr/>
+        </p:nvCxnSpPr>
+        <p:spPr>
+          <a:xfrm flipV="1">
+            <a:off x="5111973" y="627162"/>
+            <a:ext cx="252028" cy="236835"/>
+          </a:xfrm>
+          <a:prstGeom prst="straightConnector1">
+            <a:avLst/>
+          </a:prstGeom>
+          <a:ln>
+            <a:tailEnd type="triangle"/>
+          </a:ln>
+        </p:spPr>
+        <p:style>
+          <a:lnRef idx="1">
+            <a:schemeClr val="dk1"/>
+          </a:lnRef>
+          <a:fillRef idx="0">
+            <a:schemeClr val="dk1"/>
+          </a:fillRef>
+          <a:effectRef idx="0">
+            <a:schemeClr val="dk1"/>
+          </a:effectRef>
+          <a:fontRef idx="minor">
+            <a:schemeClr val="tx1"/>
+          </a:fontRef>
+        </p:style>
+      </p:cxnSp>
+      <p:cxnSp>
+        <p:nvCxnSpPr>
+          <p:cNvPr id="12" name="Conector de Seta Reta 11">
+            <a:extLst>
+              <a:ext uri="{FF2B5EF4-FFF2-40B4-BE49-F238E27FC236}">
+                <a16:creationId xmlns:a16="http://schemas.microsoft.com/office/drawing/2014/main" id="{065E8F15-D796-4DB6-B001-3F66CEFC9343}"/>
+              </a:ext>
+            </a:extLst>
+          </p:cNvPr>
+          <p:cNvCxnSpPr>
+            <a:cxnSpLocks/>
+          </p:cNvCxnSpPr>
+          <p:nvPr/>
+        </p:nvCxnSpPr>
+        <p:spPr>
+          <a:xfrm>
+            <a:off x="3023741" y="2808213"/>
+            <a:ext cx="144016" cy="432048"/>
+          </a:xfrm>
+          <a:prstGeom prst="straightConnector1">
+            <a:avLst/>
+          </a:prstGeom>
+          <a:ln>
+            <a:tailEnd type="triangle"/>
+          </a:ln>
+        </p:spPr>
+        <p:style>
+          <a:lnRef idx="1">
+            <a:schemeClr val="dk1"/>
+          </a:lnRef>
+          <a:fillRef idx="0">
+            <a:schemeClr val="dk1"/>
+          </a:fillRef>
+          <a:effectRef idx="0">
+            <a:schemeClr val="dk1"/>
+          </a:effectRef>
+          <a:fontRef idx="minor">
+            <a:schemeClr val="tx1"/>
+          </a:fontRef>
+        </p:style>
+      </p:cxnSp>
+    </p:spTree>
+    <p:extLst>
+      <p:ext uri="{BB962C8B-B14F-4D97-AF65-F5344CB8AC3E}">
+        <p14:creationId xmlns:p14="http://schemas.microsoft.com/office/powerpoint/2010/main" val="777005738"/>
+      </p:ext>
+    </p:extLst>
+  </p:cSld>
+  <p:clrMapOvr>
+    <a:masterClrMapping/>
+  </p:clrMapOvr>
+</p:sld>
+</file>
+
+<file path=ppt/slides/slide16.xml><?xml version="1.0" encoding="utf-8"?>
+<p:sld xmlns:a="http://schemas.openxmlformats.org/drawingml/2006/main" xmlns:r="http://schemas.openxmlformats.org/officeDocument/2006/relationships" xmlns:p="http://schemas.openxmlformats.org/presentationml/2006/main">
+  <p:cSld>
+    <p:spTree>
+      <p:nvGrpSpPr>
+        <p:cNvPr id="1" name=""/>
+        <p:cNvGrpSpPr/>
+        <p:nvPr/>
+      </p:nvGrpSpPr>
+      <p:grpSpPr>
+        <a:xfrm>
+          <a:off x="0" y="0"/>
+          <a:ext cx="0" cy="0"/>
+          <a:chOff x="0" y="0"/>
+          <a:chExt cx="0" cy="0"/>
+        </a:xfrm>
+      </p:grpSpPr>
+      <p:pic>
+        <p:nvPicPr>
+          <p:cNvPr id="5" name="Imagem 4">
+            <a:extLst>
+              <a:ext uri="{FF2B5EF4-FFF2-40B4-BE49-F238E27FC236}">
+                <a16:creationId xmlns:a16="http://schemas.microsoft.com/office/drawing/2014/main" id="{6F0AB9C0-C995-499F-A402-5D2B3512097D}"/>
+              </a:ext>
+            </a:extLst>
+          </p:cNvPr>
+          <p:cNvPicPr>
+            <a:picLocks noChangeAspect="1"/>
+          </p:cNvPicPr>
+          <p:nvPr/>
+        </p:nvPicPr>
+        <p:blipFill>
+          <a:blip r:embed="rId2" cstate="print">
+            <a:extLst>
+              <a:ext uri="{28A0092B-C50C-407E-A947-70E740481C1C}">
+                <a14:useLocalDpi xmlns:a14="http://schemas.microsoft.com/office/drawing/2010/main" val="0"/>
+              </a:ext>
+            </a:extLst>
+          </a:blip>
+          <a:stretch>
+            <a:fillRect/>
+          </a:stretch>
+        </p:blipFill>
+        <p:spPr>
+          <a:xfrm>
+            <a:off x="0" y="2674824"/>
+            <a:ext cx="5759450" cy="3291114"/>
+          </a:xfrm>
+          <a:prstGeom prst="rect">
+            <a:avLst/>
+          </a:prstGeom>
+        </p:spPr>
+      </p:pic>
+      <p:cxnSp>
+        <p:nvCxnSpPr>
+          <p:cNvPr id="7" name="Conector de Seta Reta 6">
+            <a:extLst>
+              <a:ext uri="{FF2B5EF4-FFF2-40B4-BE49-F238E27FC236}">
+                <a16:creationId xmlns:a16="http://schemas.microsoft.com/office/drawing/2014/main" id="{F8DDB97A-8827-4313-A11A-822FEB0A3AB5}"/>
+              </a:ext>
+            </a:extLst>
+          </p:cNvPr>
+          <p:cNvCxnSpPr/>
+          <p:nvPr/>
+        </p:nvCxnSpPr>
+        <p:spPr>
+          <a:xfrm>
+            <a:off x="1007517" y="4320381"/>
+            <a:ext cx="360040" cy="216024"/>
+          </a:xfrm>
+          <a:prstGeom prst="straightConnector1">
+            <a:avLst/>
+          </a:prstGeom>
+          <a:ln>
+            <a:tailEnd type="triangle"/>
+          </a:ln>
+        </p:spPr>
+        <p:style>
+          <a:lnRef idx="1">
+            <a:schemeClr val="dk1"/>
+          </a:lnRef>
+          <a:fillRef idx="0">
+            <a:schemeClr val="dk1"/>
+          </a:fillRef>
+          <a:effectRef idx="0">
+            <a:schemeClr val="dk1"/>
+          </a:effectRef>
+          <a:fontRef idx="minor">
+            <a:schemeClr val="tx1"/>
+          </a:fontRef>
+        </p:style>
+      </p:cxnSp>
+      <p:cxnSp>
+        <p:nvCxnSpPr>
+          <p:cNvPr id="8" name="Conector de Seta Reta 7">
+            <a:extLst>
+              <a:ext uri="{FF2B5EF4-FFF2-40B4-BE49-F238E27FC236}">
+                <a16:creationId xmlns:a16="http://schemas.microsoft.com/office/drawing/2014/main" id="{FB9242C6-16AE-479A-AA46-DCEBF82D27EF}"/>
+              </a:ext>
+            </a:extLst>
+          </p:cNvPr>
+          <p:cNvCxnSpPr>
+            <a:cxnSpLocks/>
+          </p:cNvCxnSpPr>
+          <p:nvPr/>
+        </p:nvCxnSpPr>
+        <p:spPr>
+          <a:xfrm>
+            <a:off x="1655589" y="3587446"/>
+            <a:ext cx="288032" cy="476845"/>
+          </a:xfrm>
+          <a:prstGeom prst="straightConnector1">
+            <a:avLst/>
+          </a:prstGeom>
+          <a:ln>
+            <a:tailEnd type="triangle"/>
+          </a:ln>
+        </p:spPr>
+        <p:style>
+          <a:lnRef idx="1">
+            <a:schemeClr val="dk1"/>
+          </a:lnRef>
+          <a:fillRef idx="0">
+            <a:schemeClr val="dk1"/>
+          </a:fillRef>
+          <a:effectRef idx="0">
+            <a:schemeClr val="dk1"/>
+          </a:effectRef>
+          <a:fontRef idx="minor">
+            <a:schemeClr val="tx1"/>
+          </a:fontRef>
+        </p:style>
+      </p:cxnSp>
+      <p:cxnSp>
+        <p:nvCxnSpPr>
+          <p:cNvPr id="10" name="Conector de Seta Reta 9">
+            <a:extLst>
+              <a:ext uri="{FF2B5EF4-FFF2-40B4-BE49-F238E27FC236}">
+                <a16:creationId xmlns:a16="http://schemas.microsoft.com/office/drawing/2014/main" id="{AB03A635-9287-4630-B35A-F27C77A4E42B}"/>
+              </a:ext>
+            </a:extLst>
+          </p:cNvPr>
+          <p:cNvCxnSpPr>
+            <a:cxnSpLocks/>
+          </p:cNvCxnSpPr>
+          <p:nvPr/>
+        </p:nvCxnSpPr>
+        <p:spPr>
+          <a:xfrm>
+            <a:off x="2591693" y="3384277"/>
+            <a:ext cx="0" cy="594509"/>
+          </a:xfrm>
+          <a:prstGeom prst="straightConnector1">
+            <a:avLst/>
+          </a:prstGeom>
+          <a:ln>
+            <a:tailEnd type="triangle"/>
+          </a:ln>
+        </p:spPr>
+        <p:style>
+          <a:lnRef idx="1">
+            <a:schemeClr val="dk1"/>
+          </a:lnRef>
+          <a:fillRef idx="0">
+            <a:schemeClr val="dk1"/>
+          </a:fillRef>
+          <a:effectRef idx="0">
+            <a:schemeClr val="dk1"/>
+          </a:effectRef>
+          <a:fontRef idx="minor">
+            <a:schemeClr val="tx1"/>
+          </a:fontRef>
+        </p:style>
+      </p:cxnSp>
+      <p:cxnSp>
+        <p:nvCxnSpPr>
+          <p:cNvPr id="12" name="Conector de Seta Reta 11">
+            <a:extLst>
+              <a:ext uri="{FF2B5EF4-FFF2-40B4-BE49-F238E27FC236}">
+                <a16:creationId xmlns:a16="http://schemas.microsoft.com/office/drawing/2014/main" id="{F8CAE63B-53A9-431C-B126-937B3C30B52C}"/>
+              </a:ext>
+            </a:extLst>
+          </p:cNvPr>
+          <p:cNvCxnSpPr/>
+          <p:nvPr/>
+        </p:nvCxnSpPr>
+        <p:spPr>
+          <a:xfrm>
+            <a:off x="3743821" y="4320381"/>
+            <a:ext cx="360040" cy="216024"/>
+          </a:xfrm>
+          <a:prstGeom prst="straightConnector1">
+            <a:avLst/>
+          </a:prstGeom>
+          <a:ln>
+            <a:tailEnd type="triangle"/>
+          </a:ln>
+        </p:spPr>
+        <p:style>
+          <a:lnRef idx="1">
+            <a:schemeClr val="dk1"/>
+          </a:lnRef>
+          <a:fillRef idx="0">
+            <a:schemeClr val="dk1"/>
+          </a:fillRef>
+          <a:effectRef idx="0">
+            <a:schemeClr val="dk1"/>
+          </a:effectRef>
+          <a:fontRef idx="minor">
+            <a:schemeClr val="tx1"/>
+          </a:fontRef>
+        </p:style>
+      </p:cxnSp>
+      <p:cxnSp>
+        <p:nvCxnSpPr>
+          <p:cNvPr id="13" name="Conector de Seta Reta 12">
+            <a:extLst>
+              <a:ext uri="{FF2B5EF4-FFF2-40B4-BE49-F238E27FC236}">
+                <a16:creationId xmlns:a16="http://schemas.microsoft.com/office/drawing/2014/main" id="{64DE6B18-1B7E-4908-AEF1-9E03D8686711}"/>
+              </a:ext>
+            </a:extLst>
+          </p:cNvPr>
+          <p:cNvCxnSpPr>
+            <a:cxnSpLocks/>
+          </p:cNvCxnSpPr>
+          <p:nvPr/>
+        </p:nvCxnSpPr>
+        <p:spPr>
+          <a:xfrm>
+            <a:off x="4109427" y="3447137"/>
+            <a:ext cx="288032" cy="476845"/>
+          </a:xfrm>
+          <a:prstGeom prst="straightConnector1">
+            <a:avLst/>
+          </a:prstGeom>
+          <a:ln>
+            <a:tailEnd type="triangle"/>
+          </a:ln>
+        </p:spPr>
+        <p:style>
+          <a:lnRef idx="1">
+            <a:schemeClr val="dk1"/>
+          </a:lnRef>
+          <a:fillRef idx="0">
+            <a:schemeClr val="dk1"/>
+          </a:fillRef>
+          <a:effectRef idx="0">
+            <a:schemeClr val="dk1"/>
+          </a:effectRef>
+          <a:fontRef idx="minor">
+            <a:schemeClr val="tx1"/>
+          </a:fontRef>
+        </p:style>
+      </p:cxnSp>
+      <p:cxnSp>
+        <p:nvCxnSpPr>
+          <p:cNvPr id="14" name="Conector de Seta Reta 13">
+            <a:extLst>
+              <a:ext uri="{FF2B5EF4-FFF2-40B4-BE49-F238E27FC236}">
+                <a16:creationId xmlns:a16="http://schemas.microsoft.com/office/drawing/2014/main" id="{F01B8380-5081-46A9-9096-839605FE8AA7}"/>
+              </a:ext>
+            </a:extLst>
+          </p:cNvPr>
+          <p:cNvCxnSpPr>
+            <a:cxnSpLocks/>
+          </p:cNvCxnSpPr>
+          <p:nvPr/>
+        </p:nvCxnSpPr>
+        <p:spPr>
+          <a:xfrm>
+            <a:off x="5400005" y="3329473"/>
+            <a:ext cx="0" cy="594509"/>
+          </a:xfrm>
+          <a:prstGeom prst="straightConnector1">
+            <a:avLst/>
+          </a:prstGeom>
+          <a:ln>
+            <a:tailEnd type="triangle"/>
+          </a:ln>
+        </p:spPr>
+        <p:style>
+          <a:lnRef idx="1">
+            <a:schemeClr val="dk1"/>
+          </a:lnRef>
+          <a:fillRef idx="0">
+            <a:schemeClr val="dk1"/>
+          </a:fillRef>
+          <a:effectRef idx="0">
+            <a:schemeClr val="dk1"/>
+          </a:effectRef>
+          <a:fontRef idx="minor">
+            <a:schemeClr val="tx1"/>
+          </a:fontRef>
+        </p:style>
+      </p:cxnSp>
+    </p:spTree>
+    <p:extLst>
+      <p:ext uri="{BB962C8B-B14F-4D97-AF65-F5344CB8AC3E}">
+        <p14:creationId xmlns:p14="http://schemas.microsoft.com/office/powerpoint/2010/main" val="1232225254"/>
+      </p:ext>
+    </p:extLst>
+  </p:cSld>
+  <p:clrMapOvr>
+    <a:masterClrMapping/>
+  </p:clrMapOvr>
+</p:sld>
+</file>
+
+<file path=ppt/slides/slide17.xml><?xml version="1.0" encoding="utf-8"?>
+<p:sld xmlns:a="http://schemas.openxmlformats.org/drawingml/2006/main" xmlns:r="http://schemas.openxmlformats.org/officeDocument/2006/relationships" xmlns:p="http://schemas.openxmlformats.org/presentationml/2006/main">
+  <p:cSld>
+    <p:spTree>
+      <p:nvGrpSpPr>
+        <p:cNvPr id="1" name=""/>
+        <p:cNvGrpSpPr/>
+        <p:nvPr/>
+      </p:nvGrpSpPr>
+      <p:grpSpPr>
+        <a:xfrm>
+          <a:off x="0" y="0"/>
+          <a:ext cx="0" cy="0"/>
+          <a:chOff x="0" y="0"/>
+          <a:chExt cx="0" cy="0"/>
+        </a:xfrm>
+      </p:grpSpPr>
+      <p:pic>
+        <p:nvPicPr>
+          <p:cNvPr id="3" name="Imagem 2">
+            <a:extLst>
+              <a:ext uri="{FF2B5EF4-FFF2-40B4-BE49-F238E27FC236}">
+                <a16:creationId xmlns:a16="http://schemas.microsoft.com/office/drawing/2014/main" id="{11434424-5AF6-4712-A111-15F0A46C7016}"/>
+              </a:ext>
+            </a:extLst>
+          </p:cNvPr>
+          <p:cNvPicPr>
+            <a:picLocks noChangeAspect="1"/>
+          </p:cNvPicPr>
+          <p:nvPr/>
+        </p:nvPicPr>
+        <p:blipFill>
+          <a:blip r:embed="rId2" cstate="print">
+            <a:extLst>
+              <a:ext uri="{28A0092B-C50C-407E-A947-70E740481C1C}">
+                <a14:useLocalDpi xmlns:a14="http://schemas.microsoft.com/office/drawing/2010/main" val="0"/>
+              </a:ext>
+            </a:extLst>
+          </a:blip>
+          <a:stretch>
+            <a:fillRect/>
+          </a:stretch>
+        </p:blipFill>
+        <p:spPr>
+          <a:xfrm>
+            <a:off x="0" y="2674824"/>
+            <a:ext cx="5759450" cy="3291114"/>
+          </a:xfrm>
+          <a:prstGeom prst="rect">
+            <a:avLst/>
+          </a:prstGeom>
+        </p:spPr>
+      </p:pic>
+      <p:cxnSp>
+        <p:nvCxnSpPr>
+          <p:cNvPr id="6" name="Conector reto 5">
+            <a:extLst>
+              <a:ext uri="{FF2B5EF4-FFF2-40B4-BE49-F238E27FC236}">
+                <a16:creationId xmlns:a16="http://schemas.microsoft.com/office/drawing/2014/main" id="{3D7DD0F4-AA0C-471A-A0F9-6A31FDD9C21E}"/>
+              </a:ext>
+            </a:extLst>
+          </p:cNvPr>
+          <p:cNvCxnSpPr>
+            <a:cxnSpLocks/>
+          </p:cNvCxnSpPr>
+          <p:nvPr/>
+        </p:nvCxnSpPr>
+        <p:spPr>
+          <a:xfrm flipV="1">
+            <a:off x="1909713" y="2736205"/>
+            <a:ext cx="0" cy="2880320"/>
+          </a:xfrm>
+          <a:prstGeom prst="line">
+            <a:avLst/>
+          </a:prstGeom>
+          <a:ln>
+            <a:solidFill>
+              <a:schemeClr val="tx1">
+                <a:lumMod val="50000"/>
+                <a:lumOff val="50000"/>
+              </a:schemeClr>
+            </a:solidFill>
+          </a:ln>
+        </p:spPr>
+        <p:style>
+          <a:lnRef idx="1">
+            <a:schemeClr val="dk1"/>
+          </a:lnRef>
+          <a:fillRef idx="0">
+            <a:schemeClr val="dk1"/>
+          </a:fillRef>
+          <a:effectRef idx="0">
+            <a:schemeClr val="dk1"/>
+          </a:effectRef>
+          <a:fontRef idx="minor">
+            <a:schemeClr val="tx1"/>
+          </a:fontRef>
+        </p:style>
+      </p:cxnSp>
+      <p:cxnSp>
+        <p:nvCxnSpPr>
+          <p:cNvPr id="15" name="Conector reto 14">
+            <a:extLst>
+              <a:ext uri="{FF2B5EF4-FFF2-40B4-BE49-F238E27FC236}">
+                <a16:creationId xmlns:a16="http://schemas.microsoft.com/office/drawing/2014/main" id="{680A8571-EE38-44FC-9B2C-15A529D13A91}"/>
+              </a:ext>
+            </a:extLst>
+          </p:cNvPr>
+          <p:cNvCxnSpPr>
+            <a:cxnSpLocks/>
+          </p:cNvCxnSpPr>
+          <p:nvPr/>
+        </p:nvCxnSpPr>
+        <p:spPr>
+          <a:xfrm flipV="1">
+            <a:off x="2692276" y="2736205"/>
+            <a:ext cx="0" cy="2880320"/>
+          </a:xfrm>
+          <a:prstGeom prst="line">
+            <a:avLst/>
+          </a:prstGeom>
+          <a:ln>
+            <a:solidFill>
+              <a:schemeClr val="tx1">
+                <a:lumMod val="50000"/>
+                <a:lumOff val="50000"/>
+              </a:schemeClr>
+            </a:solidFill>
+          </a:ln>
+        </p:spPr>
+        <p:style>
+          <a:lnRef idx="1">
+            <a:schemeClr val="dk1"/>
+          </a:lnRef>
+          <a:fillRef idx="0">
+            <a:schemeClr val="dk1"/>
+          </a:fillRef>
+          <a:effectRef idx="0">
+            <a:schemeClr val="dk1"/>
+          </a:effectRef>
+          <a:fontRef idx="minor">
+            <a:schemeClr val="tx1"/>
+          </a:fontRef>
+        </p:style>
+      </p:cxnSp>
+      <p:sp>
+        <p:nvSpPr>
+          <p:cNvPr id="11" name="CaixaDeTexto 10">
+            <a:extLst>
+              <a:ext uri="{FF2B5EF4-FFF2-40B4-BE49-F238E27FC236}">
+                <a16:creationId xmlns:a16="http://schemas.microsoft.com/office/drawing/2014/main" id="{5085421E-C549-40DF-A0CF-48D2AC012678}"/>
+              </a:ext>
+            </a:extLst>
+          </p:cNvPr>
+          <p:cNvSpPr txBox="1"/>
+          <p:nvPr/>
         </p:nvSpPr>
-        <p:spPr/>
+        <p:spPr>
+          <a:xfrm>
+            <a:off x="1001382" y="3456285"/>
+            <a:ext cx="504044" cy="369332"/>
+          </a:xfrm>
+          <a:prstGeom prst="rect">
+            <a:avLst/>
+          </a:prstGeom>
+          <a:noFill/>
+        </p:spPr>
         <p:txBody>
-          <a:bodyPr/>
+          <a:bodyPr wrap="square" rtlCol="0">
+            <a:spAutoFit/>
+          </a:bodyPr>
           <a:lstStyle/>
           <a:p>
-            <a:endParaRPr lang="pt-BR"/>
+            <a:pPr algn="ctr"/>
+            <a:r>
+              <a:rPr lang="pt-BR" dirty="0">
+                <a:latin typeface="Arial" panose="020B0604020202020204" pitchFamily="34" charset="0"/>
+                <a:cs typeface="Arial" panose="020B0604020202020204" pitchFamily="34" charset="0"/>
+              </a:rPr>
+              <a:t>31</a:t>
+            </a:r>
           </a:p>
         </p:txBody>
       </p:sp>
       <p:sp>
         <p:nvSpPr>
-          <p:cNvPr id="5" name="Espaço Reservado para Conteúdo 4">
+          <p:cNvPr id="16" name="CaixaDeTexto 15">
             <a:extLst>
               <a:ext uri="{FF2B5EF4-FFF2-40B4-BE49-F238E27FC236}">
-                <a16:creationId xmlns:a16="http://schemas.microsoft.com/office/drawing/2014/main" id="{090E81A0-AE6D-43B0-84DE-96452B153D43}"/>
+                <a16:creationId xmlns:a16="http://schemas.microsoft.com/office/drawing/2014/main" id="{D8894B31-E61E-41C5-B929-E072A1534CA0}"/>
               </a:ext>
             </a:extLst>
           </p:cNvPr>
-          <p:cNvSpPr>
-            <a:spLocks noGrp="1"/>
-          </p:cNvSpPr>
-          <p:nvPr>
-            <p:ph idx="1"/>
-          </p:nvPr>
+          <p:cNvSpPr txBox="1"/>
+          <p:nvPr/>
         </p:nvSpPr>
-        <p:spPr/>
+        <p:spPr>
+          <a:xfrm>
+            <a:off x="2048973" y="3454995"/>
+            <a:ext cx="504044" cy="369332"/>
+          </a:xfrm>
+          <a:prstGeom prst="rect">
+            <a:avLst/>
+          </a:prstGeom>
+          <a:noFill/>
+        </p:spPr>
         <p:txBody>
-          <a:bodyPr/>
+          <a:bodyPr wrap="square" rtlCol="0">
+            <a:spAutoFit/>
+          </a:bodyPr>
           <a:lstStyle/>
           <a:p>
-            <a:endParaRPr lang="pt-BR"/>
+            <a:pPr algn="ctr"/>
+            <a:r>
+              <a:rPr lang="pt-BR" dirty="0">
+                <a:latin typeface="Arial" panose="020B0604020202020204" pitchFamily="34" charset="0"/>
+                <a:cs typeface="Arial" panose="020B0604020202020204" pitchFamily="34" charset="0"/>
+              </a:rPr>
+              <a:t>19</a:t>
+            </a:r>
           </a:p>
         </p:txBody>
       </p:sp>
+      <p:sp>
+        <p:nvSpPr>
+          <p:cNvPr id="17" name="CaixaDeTexto 16">
+            <a:extLst>
+              <a:ext uri="{FF2B5EF4-FFF2-40B4-BE49-F238E27FC236}">
+                <a16:creationId xmlns:a16="http://schemas.microsoft.com/office/drawing/2014/main" id="{B426ACAB-467E-4A36-B42B-569C828839B6}"/>
+              </a:ext>
+            </a:extLst>
+          </p:cNvPr>
+          <p:cNvSpPr txBox="1"/>
+          <p:nvPr/>
+        </p:nvSpPr>
+        <p:spPr>
+          <a:xfrm>
+            <a:off x="3582559" y="3454995"/>
+            <a:ext cx="504044" cy="369332"/>
+          </a:xfrm>
+          <a:prstGeom prst="rect">
+            <a:avLst/>
+          </a:prstGeom>
+          <a:noFill/>
+        </p:spPr>
+        <p:txBody>
+          <a:bodyPr wrap="square" rtlCol="0">
+            <a:spAutoFit/>
+          </a:bodyPr>
+          <a:lstStyle/>
+          <a:p>
+            <a:pPr algn="ctr"/>
+            <a:r>
+              <a:rPr lang="pt-BR" dirty="0">
+                <a:latin typeface="Arial" panose="020B0604020202020204" pitchFamily="34" charset="0"/>
+                <a:cs typeface="Arial" panose="020B0604020202020204" pitchFamily="34" charset="0"/>
+              </a:rPr>
+              <a:t>25</a:t>
+            </a:r>
+          </a:p>
+        </p:txBody>
+      </p:sp>
+      <p:cxnSp>
+        <p:nvCxnSpPr>
+          <p:cNvPr id="19" name="Conector de Seta Reta 18">
+            <a:extLst>
+              <a:ext uri="{FF2B5EF4-FFF2-40B4-BE49-F238E27FC236}">
+                <a16:creationId xmlns:a16="http://schemas.microsoft.com/office/drawing/2014/main" id="{5AFBABD6-CA73-4317-87EC-962ADF9D19F2}"/>
+              </a:ext>
+            </a:extLst>
+          </p:cNvPr>
+          <p:cNvCxnSpPr>
+            <a:cxnSpLocks/>
+            <a:stCxn id="11" idx="2"/>
+          </p:cNvCxnSpPr>
+          <p:nvPr/>
+        </p:nvCxnSpPr>
+        <p:spPr>
+          <a:xfrm>
+            <a:off x="1253404" y="3825617"/>
+            <a:ext cx="0" cy="1574884"/>
+          </a:xfrm>
+          <a:prstGeom prst="straightConnector1">
+            <a:avLst/>
+          </a:prstGeom>
+          <a:ln>
+            <a:solidFill>
+              <a:schemeClr val="tx1">
+                <a:lumMod val="50000"/>
+                <a:lumOff val="50000"/>
+              </a:schemeClr>
+            </a:solidFill>
+            <a:tailEnd type="triangle"/>
+          </a:ln>
+        </p:spPr>
+        <p:style>
+          <a:lnRef idx="1">
+            <a:schemeClr val="dk1"/>
+          </a:lnRef>
+          <a:fillRef idx="0">
+            <a:schemeClr val="dk1"/>
+          </a:fillRef>
+          <a:effectRef idx="0">
+            <a:schemeClr val="dk1"/>
+          </a:effectRef>
+          <a:fontRef idx="minor">
+            <a:schemeClr val="tx1"/>
+          </a:fontRef>
+        </p:style>
+      </p:cxnSp>
+      <p:cxnSp>
+        <p:nvCxnSpPr>
+          <p:cNvPr id="20" name="Conector de Seta Reta 19">
+            <a:extLst>
+              <a:ext uri="{FF2B5EF4-FFF2-40B4-BE49-F238E27FC236}">
+                <a16:creationId xmlns:a16="http://schemas.microsoft.com/office/drawing/2014/main" id="{EDBF2E31-5966-404A-9DB9-9759361D3A30}"/>
+              </a:ext>
+            </a:extLst>
+          </p:cNvPr>
+          <p:cNvCxnSpPr>
+            <a:cxnSpLocks/>
+          </p:cNvCxnSpPr>
+          <p:nvPr/>
+        </p:nvCxnSpPr>
+        <p:spPr>
+          <a:xfrm>
+            <a:off x="2306624" y="3825617"/>
+            <a:ext cx="0" cy="1214844"/>
+          </a:xfrm>
+          <a:prstGeom prst="straightConnector1">
+            <a:avLst/>
+          </a:prstGeom>
+          <a:ln>
+            <a:solidFill>
+              <a:schemeClr val="tx1">
+                <a:lumMod val="50000"/>
+                <a:lumOff val="50000"/>
+              </a:schemeClr>
+            </a:solidFill>
+            <a:tailEnd type="triangle"/>
+          </a:ln>
+        </p:spPr>
+        <p:style>
+          <a:lnRef idx="1">
+            <a:schemeClr val="dk1"/>
+          </a:lnRef>
+          <a:fillRef idx="0">
+            <a:schemeClr val="dk1"/>
+          </a:fillRef>
+          <a:effectRef idx="0">
+            <a:schemeClr val="dk1"/>
+          </a:effectRef>
+          <a:fontRef idx="minor">
+            <a:schemeClr val="tx1"/>
+          </a:fontRef>
+        </p:style>
+      </p:cxnSp>
+      <p:cxnSp>
+        <p:nvCxnSpPr>
+          <p:cNvPr id="21" name="Conector de Seta Reta 20">
+            <a:extLst>
+              <a:ext uri="{FF2B5EF4-FFF2-40B4-BE49-F238E27FC236}">
+                <a16:creationId xmlns:a16="http://schemas.microsoft.com/office/drawing/2014/main" id="{9AEE80E4-D0DD-4BB3-A9A8-6942A698054E}"/>
+              </a:ext>
+            </a:extLst>
+          </p:cNvPr>
+          <p:cNvCxnSpPr>
+            <a:cxnSpLocks/>
+          </p:cNvCxnSpPr>
+          <p:nvPr/>
+        </p:nvCxnSpPr>
+        <p:spPr>
+          <a:xfrm>
+            <a:off x="3807580" y="3825617"/>
+            <a:ext cx="0" cy="1142836"/>
+          </a:xfrm>
+          <a:prstGeom prst="straightConnector1">
+            <a:avLst/>
+          </a:prstGeom>
+          <a:ln>
+            <a:solidFill>
+              <a:schemeClr val="tx1">
+                <a:lumMod val="50000"/>
+                <a:lumOff val="50000"/>
+              </a:schemeClr>
+            </a:solidFill>
+            <a:tailEnd type="triangle"/>
+          </a:ln>
+        </p:spPr>
+        <p:style>
+          <a:lnRef idx="1">
+            <a:schemeClr val="dk1"/>
+          </a:lnRef>
+          <a:fillRef idx="0">
+            <a:schemeClr val="dk1"/>
+          </a:fillRef>
+          <a:effectRef idx="0">
+            <a:schemeClr val="dk1"/>
+          </a:effectRef>
+          <a:fontRef idx="minor">
+            <a:schemeClr val="tx1"/>
+          </a:fontRef>
+        </p:style>
+      </p:cxnSp>
     </p:spTree>
     <p:extLst>
       <p:ext uri="{BB962C8B-B14F-4D97-AF65-F5344CB8AC3E}">
-        <p14:creationId xmlns:p14="http://schemas.microsoft.com/office/powerpoint/2010/main" val="777005738"/>
+        <p14:creationId xmlns:p14="http://schemas.microsoft.com/office/powerpoint/2010/main" val="3555695090"/>
       </p:ext>
     </p:extLst>
   </p:cSld>

</xml_diff>